<commit_message>
2160 L1 small fix
</commit_message>
<xml_diff>
--- a/eece2160/f16/lectures/eece.2160f16_lec1_intro.pptx
+++ b/eece2160/f16/lectures/eece.2160f16_lec1_intro.pptx
@@ -2313,7 +2313,7 @@
           <a:p>
             <a:fld id="{F6AB22BC-3F13-D041-B7E7-53D345F3D506}" type="datetime1">
               <a:rPr lang="en-US" smtClean="0"/>
-              <a:t>9/1/16</a:t>
+              <a:t>9/2/16</a:t>
             </a:fld>
             <a:endParaRPr lang="en-US"/>
           </a:p>
@@ -2509,7 +2509,7 @@
           <a:p>
             <a:fld id="{CE50B5AC-4C1F-BC48-8E9E-825342826844}" type="datetime1">
               <a:rPr lang="en-US" smtClean="0"/>
-              <a:t>9/1/16</a:t>
+              <a:t>9/2/16</a:t>
             </a:fld>
             <a:endParaRPr lang="en-US"/>
           </a:p>
@@ -2714,7 +2714,7 @@
           <a:p>
             <a:fld id="{19140AB6-D9F1-7F4C-8DDB-13DA33D45B67}" type="datetime1">
               <a:rPr lang="en-US" smtClean="0"/>
-              <a:t>9/1/16</a:t>
+              <a:t>9/2/16</a:t>
             </a:fld>
             <a:endParaRPr lang="en-US"/>
           </a:p>
@@ -2976,7 +2976,7 @@
           <a:p>
             <a:fld id="{1D8A0311-486A-EE4B-8667-B72E790F4B34}" type="datetime1">
               <a:rPr lang="en-US" smtClean="0"/>
-              <a:t>9/1/16</a:t>
+              <a:t>9/2/16</a:t>
             </a:fld>
             <a:endParaRPr lang="en-US"/>
           </a:p>
@@ -3238,7 +3238,7 @@
           <a:p>
             <a:fld id="{7BF49E88-F204-CF48-9256-C1FED9EE3C63}" type="datetime1">
               <a:rPr lang="en-US" smtClean="0"/>
-              <a:t>9/1/16</a:t>
+              <a:t>9/2/16</a:t>
             </a:fld>
             <a:endParaRPr lang="en-US"/>
           </a:p>
@@ -3433,7 +3433,7 @@
           <a:p>
             <a:fld id="{BA7177C3-D81E-3741-A84F-39E996C00AC0}" type="datetime1">
               <a:rPr lang="en-US" smtClean="0"/>
-              <a:t>9/1/16</a:t>
+              <a:t>9/2/16</a:t>
             </a:fld>
             <a:endParaRPr lang="en-US"/>
           </a:p>
@@ -3650,7 +3650,7 @@
           <a:p>
             <a:fld id="{2484A921-CD18-F748-876E-9D7B936434CD}" type="datetime1">
               <a:rPr lang="en-US" smtClean="0"/>
-              <a:t>9/1/16</a:t>
+              <a:t>9/2/16</a:t>
             </a:fld>
             <a:endParaRPr lang="en-US"/>
           </a:p>
@@ -3963,7 +3963,7 @@
           <a:p>
             <a:fld id="{79EC2E33-3B9F-1F4C-86B8-731DA9EDE679}" type="datetime1">
               <a:rPr lang="en-US" smtClean="0"/>
-              <a:t>9/1/16</a:t>
+              <a:t>9/2/16</a:t>
             </a:fld>
             <a:endParaRPr lang="en-US"/>
           </a:p>
@@ -4415,7 +4415,7 @@
           <a:p>
             <a:fld id="{84F2A380-89CA-8A4B-8697-6289D3F7530D}" type="datetime1">
               <a:rPr lang="en-US" smtClean="0"/>
-              <a:t>9/1/16</a:t>
+              <a:t>9/2/16</a:t>
             </a:fld>
             <a:endParaRPr lang="en-US"/>
           </a:p>
@@ -4558,7 +4558,7 @@
           <a:p>
             <a:fld id="{BEC2A9CF-B718-1340-B187-248523176641}" type="datetime1">
               <a:rPr lang="en-US" smtClean="0"/>
-              <a:t>9/1/16</a:t>
+              <a:t>9/2/16</a:t>
             </a:fld>
             <a:endParaRPr lang="en-US"/>
           </a:p>
@@ -4678,7 +4678,7 @@
           <a:p>
             <a:fld id="{08CD3B3E-3CD8-4C4D-AC23-A81D295B31C3}" type="datetime1">
               <a:rPr lang="en-US" smtClean="0"/>
-              <a:t>9/1/16</a:t>
+              <a:t>9/2/16</a:t>
             </a:fld>
             <a:endParaRPr lang="en-US"/>
           </a:p>
@@ -4980,7 +4980,7 @@
           <a:p>
             <a:fld id="{86EAE07D-08A0-6F42-8722-4AD6DB3DECDF}" type="datetime1">
               <a:rPr lang="en-US" smtClean="0"/>
-              <a:t>9/1/16</a:t>
+              <a:t>9/2/16</a:t>
             </a:fld>
             <a:endParaRPr lang="en-US"/>
           </a:p>
@@ -5259,7 +5259,7 @@
           <a:p>
             <a:fld id="{2F7A613D-EFF1-024E-AEF1-6A01C3079629}" type="datetime1">
               <a:rPr lang="en-US" smtClean="0"/>
-              <a:t>9/1/16</a:t>
+              <a:t>9/2/16</a:t>
             </a:fld>
             <a:endParaRPr lang="en-US"/>
           </a:p>
@@ -5557,7 +5557,7 @@
           <a:p>
             <a:fld id="{70E50D42-73AC-8742-B23A-E48C40F82084}" type="datetime1">
               <a:rPr lang="en-US" smtClean="0"/>
-              <a:t>9/1/16</a:t>
+              <a:t>9/2/16</a:t>
             </a:fld>
             <a:endParaRPr lang="en-US"/>
           </a:p>
@@ -6333,9 +6333,6 @@
               </a:rPr>
               <a:t>Instructor:  </a:t>
             </a:r>
-            <a:endParaRPr lang="en-US" dirty="0" smtClean="0">
-              <a:latin typeface="Arial" charset="0"/>
-            </a:endParaRPr>
           </a:p>
           <a:p>
             <a:pPr algn="ctr" eaLnBrk="1" hangingPunct="1">
@@ -6631,7 +6628,7 @@
           <a:p>
             <a:fld id="{3ABB7120-FCF2-F743-9D52-C4937A807088}" type="datetime1">
               <a:rPr lang="en-US" smtClean="0"/>
-              <a:t>9/1/16</a:t>
+              <a:t>9/2/16</a:t>
             </a:fld>
             <a:endParaRPr lang="en-US"/>
           </a:p>
@@ -6859,7 +6856,7 @@
               <a:rPr lang="en-US" smtClean="0">
                 <a:latin typeface="Garamond" charset="0"/>
               </a:rPr>
-              <a:t>9/1/16</a:t>
+              <a:t>9/2/16</a:t>
             </a:fld>
             <a:endParaRPr lang="en-US">
               <a:latin typeface="Garamond" charset="0"/>
@@ -7283,19 +7280,7 @@
               <a:rPr lang="en-US" dirty="0" smtClean="0">
                 <a:latin typeface="Arial" charset="0"/>
               </a:rPr>
-              <a:t>finals; likely common </a:t>
-            </a:r>
-            <a:r>
-              <a:rPr lang="en-US" dirty="0" smtClean="0">
-                <a:latin typeface="Arial" charset="0"/>
-              </a:rPr>
-              <a:t>for both sections</a:t>
-            </a:r>
-            <a:r>
-              <a:rPr lang="en-US" dirty="0" smtClean="0">
-                <a:latin typeface="Arial" charset="0"/>
-              </a:rPr>
-              <a:t>)</a:t>
+              <a:t>finals; likely common for both sections)</a:t>
             </a:r>
             <a:endParaRPr lang="en-US" dirty="0">
               <a:latin typeface="Arial" charset="0"/>
@@ -7470,7 +7455,7 @@
               <a:rPr lang="en-US" smtClean="0">
                 <a:latin typeface="Garamond" charset="0"/>
               </a:rPr>
-              <a:t>9/1/16</a:t>
+              <a:t>9/2/16</a:t>
             </a:fld>
             <a:endParaRPr lang="en-US">
               <a:latin typeface="Garamond" charset="0"/>
@@ -7799,13 +7784,7 @@
               <a:rPr lang="en-US" dirty="0" smtClean="0">
                 <a:ea typeface="+mn-ea"/>
               </a:rPr>
-              <a:t>File </a:t>
-            </a:r>
-            <a:r>
-              <a:rPr lang="en-US" dirty="0" smtClean="0">
-                <a:ea typeface="+mn-ea"/>
-              </a:rPr>
-              <a:t>&amp; general input/output</a:t>
+              <a:t>File &amp; general input/output</a:t>
             </a:r>
             <a:endParaRPr lang="en-US" dirty="0">
               <a:ea typeface="+mn-ea"/>
@@ -8086,7 +8065,7 @@
               <a:rPr lang="en-US" smtClean="0">
                 <a:latin typeface="Garamond" charset="0"/>
               </a:rPr>
-              <a:t>9/1/16</a:t>
+              <a:t>9/2/16</a:t>
             </a:fld>
             <a:endParaRPr lang="en-US">
               <a:latin typeface="Garamond" charset="0"/>
@@ -8562,7 +8541,7 @@
               <a:rPr lang="en-US" smtClean="0">
                 <a:latin typeface="Garamond" charset="0"/>
               </a:rPr>
-              <a:t>9/1/16</a:t>
+              <a:t>9/2/16</a:t>
             </a:fld>
             <a:endParaRPr lang="en-US">
               <a:latin typeface="Garamond" charset="0"/>
@@ -9265,7 +9244,7 @@
               <a:rPr lang="en-US" smtClean="0">
                 <a:latin typeface="Garamond" charset="0"/>
               </a:rPr>
-              <a:t>9/1/16</a:t>
+              <a:t>9/2/16</a:t>
             </a:fld>
             <a:endParaRPr lang="en-US">
               <a:latin typeface="Garamond" charset="0"/>
@@ -9980,7 +9959,7 @@
               <a:rPr lang="en-US" smtClean="0">
                 <a:latin typeface="Garamond" charset="0"/>
               </a:rPr>
-              <a:t>9/1/16</a:t>
+              <a:t>9/2/16</a:t>
             </a:fld>
             <a:endParaRPr lang="en-US">
               <a:latin typeface="Garamond" charset="0"/>
@@ -10869,7 +10848,7 @@
               <a:rPr lang="en-US" smtClean="0">
                 <a:latin typeface="Garamond" charset="0"/>
               </a:rPr>
-              <a:t>9/1/16</a:t>
+              <a:t>9/2/16</a:t>
             </a:fld>
             <a:endParaRPr lang="en-US">
               <a:latin typeface="Garamond" charset="0"/>
@@ -11519,12 +11498,8 @@
           <a:p>
             <a:pPr lvl="1"/>
             <a:r>
-              <a:rPr lang="en-US" smtClean="0"/>
-              <a:t>Basic C </a:t>
-            </a:r>
-            <a:r>
               <a:rPr lang="en-US" dirty="0" smtClean="0"/>
-              <a:t>program structure</a:t>
+              <a:t>Basic C program structure</a:t>
             </a:r>
           </a:p>
           <a:p>
@@ -11572,8 +11547,13 @@
             <a:pPr lvl="1"/>
             <a:r>
               <a:rPr lang="en-US" dirty="0" smtClean="0"/>
-              <a:t>Program 1 due Wednesday, 1/27</a:t>
-            </a:r>
+              <a:t>Program 1 due </a:t>
+            </a:r>
+            <a:r>
+              <a:rPr lang="en-US" dirty="0" smtClean="0"/>
+              <a:t>Monday, 9/12</a:t>
+            </a:r>
+            <a:endParaRPr lang="en-US" dirty="0" smtClean="0"/>
           </a:p>
           <a:p>
             <a:pPr lvl="2">
@@ -11760,7 +11740,7 @@
           <a:p>
             <a:fld id="{217E7EE8-5A33-1F4C-9F04-26D2120514DE}" type="datetime1">
               <a:rPr lang="en-US" smtClean="0"/>
-              <a:t>9/1/16</a:t>
+              <a:t>9/2/16</a:t>
             </a:fld>
             <a:endParaRPr lang="en-US"/>
           </a:p>
@@ -12389,7 +12369,7 @@
               <a:rPr lang="en-US" smtClean="0">
                 <a:latin typeface="Garamond" charset="0"/>
               </a:rPr>
-              <a:t>9/1/16</a:t>
+              <a:t>9/2/16</a:t>
             </a:fld>
             <a:endParaRPr lang="en-US">
               <a:latin typeface="Garamond" charset="0"/>
@@ -12734,7 +12714,7 @@
               <a:rPr lang="en-US" smtClean="0">
                 <a:latin typeface="Garamond" charset="0"/>
               </a:rPr>
-              <a:t>9/1/16</a:t>
+              <a:t>9/2/16</a:t>
             </a:fld>
             <a:endParaRPr lang="en-US">
               <a:latin typeface="Garamond" charset="0"/>
@@ -12995,13 +12975,7 @@
               <a:rPr lang="en-US" dirty="0" smtClean="0">
                 <a:latin typeface="Arial" charset="0"/>
               </a:rPr>
-              <a:t>Section 201: MWF </a:t>
-            </a:r>
-            <a:r>
-              <a:rPr lang="en-US" dirty="0" smtClean="0">
-                <a:latin typeface="Arial" charset="0"/>
-              </a:rPr>
-              <a:t>12-12:</a:t>
+              <a:t>Section 201: MWF 12-12:</a:t>
             </a:r>
             <a:r>
               <a:rPr lang="en-US" dirty="0">
@@ -13034,19 +13008,7 @@
               <a:rPr lang="en-US" dirty="0" smtClean="0">
                 <a:latin typeface="Arial" charset="0"/>
               </a:rPr>
-              <a:t>Section 202: MWF </a:t>
-            </a:r>
-            <a:r>
-              <a:rPr lang="en-US" dirty="0" smtClean="0">
-                <a:latin typeface="Arial" charset="0"/>
-              </a:rPr>
-              <a:t>1-1:</a:t>
-            </a:r>
-            <a:r>
-              <a:rPr lang="en-US" dirty="0" smtClean="0">
-                <a:latin typeface="Arial" charset="0"/>
-              </a:rPr>
-              <a:t>50, </a:t>
+              <a:t>Section 202: MWF 1-1:50, </a:t>
             </a:r>
             <a:r>
               <a:rPr lang="en-US" dirty="0" err="1" smtClean="0">
@@ -13271,7 +13233,7 @@
               <a:rPr lang="en-US" smtClean="0">
                 <a:latin typeface="Garamond" charset="0"/>
               </a:rPr>
-              <a:t>9/1/16</a:t>
+              <a:t>9/2/16</a:t>
             </a:fld>
             <a:endParaRPr lang="en-US">
               <a:latin typeface="Garamond" charset="0"/>
@@ -13500,7 +13462,7 @@
         </p:spPr>
         <p:txBody>
           <a:bodyPr>
-            <a:normAutofit lnSpcReduction="10000"/>
+            <a:normAutofit fontScale="92500" lnSpcReduction="10000"/>
           </a:bodyPr>
           <a:lstStyle/>
           <a:p>
@@ -13619,37 +13581,13 @@
               <a:rPr lang="en-US" dirty="0">
                 <a:latin typeface="Arial" charset="0"/>
               </a:rPr>
-              <a:t> M </a:t>
-            </a:r>
-            <a:r>
-              <a:rPr lang="en-US" dirty="0">
-                <a:latin typeface="Arial" charset="0"/>
-              </a:rPr>
-              <a:t>9</a:t>
+              <a:t> M 9</a:t>
             </a:r>
             <a:r>
               <a:rPr lang="en-US" dirty="0" smtClean="0">
                 <a:latin typeface="Arial" charset="0"/>
               </a:rPr>
-              <a:t>-</a:t>
-            </a:r>
-            <a:r>
-              <a:rPr lang="en-US" dirty="0" smtClean="0">
-                <a:latin typeface="Arial" charset="0"/>
-              </a:rPr>
-              <a:t>10</a:t>
-            </a:r>
-            <a:r>
-              <a:rPr lang="en-US" dirty="0" smtClean="0">
-                <a:latin typeface="Arial" charset="0"/>
-              </a:rPr>
-              <a:t>:</a:t>
-            </a:r>
-            <a:r>
-              <a:rPr lang="en-US" dirty="0" smtClean="0">
-                <a:latin typeface="Arial" charset="0"/>
-              </a:rPr>
-              <a:t>30, </a:t>
+              <a:t>-10:30, </a:t>
             </a:r>
             <a:r>
               <a:rPr lang="en-US" dirty="0">
@@ -13782,24 +13720,9 @@
               </a:rPr>
               <a:t>Teaching assistants: </a:t>
             </a:r>
-            <a:r>
-              <a:rPr lang="en-US" dirty="0" err="1" smtClean="0">
-                <a:latin typeface="Arial" charset="0"/>
-              </a:rPr>
-              <a:t>Zhendong</a:t>
-            </a:r>
-            <a:r>
-              <a:rPr lang="en-US" dirty="0" smtClean="0">
-                <a:latin typeface="Arial" charset="0"/>
-              </a:rPr>
-              <a:t> Wang &amp; </a:t>
-            </a:r>
-            <a:r>
-              <a:rPr lang="en-US" dirty="0" smtClean="0">
-                <a:latin typeface="Arial" charset="0"/>
-              </a:rPr>
-              <a:t>Li Zhou</a:t>
-            </a:r>
+            <a:endParaRPr lang="en-US" dirty="0" smtClean="0">
+              <a:latin typeface="Arial" charset="0"/>
+            </a:endParaRPr>
           </a:p>
           <a:p>
             <a:pPr lvl="1" eaLnBrk="1" hangingPunct="1">
@@ -13808,10 +13731,131 @@
               </a:lnSpc>
             </a:pPr>
             <a:r>
+              <a:rPr lang="en-US" dirty="0" err="1" smtClean="0">
+                <a:latin typeface="Arial" charset="0"/>
+              </a:rPr>
+              <a:t>Zhendong</a:t>
+            </a:r>
+            <a:r>
               <a:rPr lang="en-US" dirty="0" smtClean="0">
                 <a:latin typeface="Arial" charset="0"/>
               </a:rPr>
-              <a:t>Office hours, contact info TBA</a:t>
+              <a:t> </a:t>
+            </a:r>
+            <a:r>
+              <a:rPr lang="en-US" dirty="0" smtClean="0">
+                <a:latin typeface="Arial" charset="0"/>
+              </a:rPr>
+              <a:t>Wang </a:t>
+            </a:r>
+            <a:endParaRPr lang="en-US" dirty="0" smtClean="0">
+              <a:latin typeface="Arial" charset="0"/>
+            </a:endParaRPr>
+          </a:p>
+          <a:p>
+            <a:pPr marL="344487" lvl="1" indent="0" eaLnBrk="1" hangingPunct="1">
+              <a:lnSpc>
+                <a:spcPct val="90000"/>
+              </a:lnSpc>
+              <a:buNone/>
+            </a:pPr>
+            <a:r>
+              <a:rPr lang="en-US" dirty="0">
+                <a:latin typeface="Arial" charset="0"/>
+              </a:rPr>
+              <a:t>	</a:t>
+            </a:r>
+            <a:r>
+              <a:rPr lang="en-US" dirty="0" smtClean="0">
+                <a:latin typeface="Arial" charset="0"/>
+              </a:rPr>
+              <a:t>(</a:t>
+            </a:r>
+            <a:r>
+              <a:rPr lang="en-US" u="sng" dirty="0" smtClean="0">
+                <a:latin typeface="Arial" charset="0"/>
+              </a:rPr>
+              <a:t>e-mail:</a:t>
+            </a:r>
+            <a:r>
+              <a:rPr lang="en-US" dirty="0" smtClean="0">
+                <a:latin typeface="Arial" charset="0"/>
+              </a:rPr>
+              <a:t> </a:t>
+            </a:r>
+            <a:r>
+              <a:rPr lang="en-US" dirty="0" err="1" smtClean="0">
+                <a:latin typeface="Arial" charset="0"/>
+              </a:rPr>
+              <a:t>Zhendong_Wang@student.uml.edu</a:t>
+            </a:r>
+            <a:r>
+              <a:rPr lang="en-US" dirty="0" smtClean="0">
+                <a:latin typeface="Arial" charset="0"/>
+              </a:rPr>
+              <a:t>)</a:t>
+            </a:r>
+            <a:endParaRPr lang="en-US" dirty="0" smtClean="0">
+              <a:latin typeface="Arial" charset="0"/>
+            </a:endParaRPr>
+          </a:p>
+          <a:p>
+            <a:pPr lvl="1" eaLnBrk="1" hangingPunct="1">
+              <a:lnSpc>
+                <a:spcPct val="90000"/>
+              </a:lnSpc>
+            </a:pPr>
+            <a:r>
+              <a:rPr lang="en-US" dirty="0" smtClean="0">
+                <a:latin typeface="Arial" charset="0"/>
+              </a:rPr>
+              <a:t>Li Zhou (</a:t>
+            </a:r>
+            <a:r>
+              <a:rPr lang="en-US" u="sng" dirty="0" smtClean="0">
+                <a:latin typeface="Arial" charset="0"/>
+              </a:rPr>
+              <a:t>e-mail:</a:t>
+            </a:r>
+            <a:r>
+              <a:rPr lang="en-US" dirty="0" smtClean="0">
+                <a:latin typeface="Arial" charset="0"/>
+              </a:rPr>
+              <a:t> </a:t>
+            </a:r>
+            <a:r>
+              <a:rPr lang="en-US" dirty="0" err="1" smtClean="0">
+                <a:latin typeface="Arial" charset="0"/>
+              </a:rPr>
+              <a:t>Li_Zhou@student.uml.edu</a:t>
+            </a:r>
+            <a:r>
+              <a:rPr lang="en-US" dirty="0" smtClean="0">
+                <a:latin typeface="Arial" charset="0"/>
+              </a:rPr>
+              <a:t>)</a:t>
+            </a:r>
+            <a:endParaRPr lang="en-US" dirty="0" smtClean="0">
+              <a:latin typeface="Arial" charset="0"/>
+            </a:endParaRPr>
+          </a:p>
+          <a:p>
+            <a:pPr lvl="1" eaLnBrk="1" hangingPunct="1">
+              <a:lnSpc>
+                <a:spcPct val="90000"/>
+              </a:lnSpc>
+            </a:pPr>
+            <a:r>
+              <a:rPr lang="en-US" dirty="0" smtClean="0">
+                <a:latin typeface="Arial" charset="0"/>
+              </a:rPr>
+              <a:t>Office </a:t>
+            </a:r>
+            <a:r>
+              <a:rPr lang="en-US" dirty="0" smtClean="0">
+                <a:latin typeface="Arial" charset="0"/>
+              </a:rPr>
+              <a:t>hours TBA—will be based on Doodle poll</a:t>
             </a:r>
             <a:endParaRPr lang="en-US" dirty="0">
               <a:latin typeface="Arial" charset="0"/>
@@ -13991,7 +14035,7 @@
               <a:rPr lang="en-US" smtClean="0">
                 <a:latin typeface="Garamond" charset="0"/>
               </a:rPr>
-              <a:t>9/1/16</a:t>
+              <a:t>9/2/16</a:t>
             </a:fld>
             <a:endParaRPr lang="en-US">
               <a:latin typeface="Garamond" charset="0"/>
@@ -14480,7 +14524,16 @@
                 </a:solidFill>
                 <a:latin typeface="Arial" charset="0"/>
               </a:rPr>
-              <a:t>/eece2160</a:t>
+              <a:t>/eece2160/</a:t>
+            </a:r>
+            <a:r>
+              <a:rPr lang="en-US" sz="2400" dirty="0">
+                <a:solidFill>
+                  <a:srgbClr val="0000FF"/>
+                </a:solidFill>
+                <a:latin typeface="Arial" charset="0"/>
+              </a:rPr>
+              <a:t>f</a:t>
             </a:r>
             <a:r>
               <a:rPr lang="en-US" sz="2400" dirty="0" smtClean="0">
@@ -14489,34 +14542,7 @@
                 </a:solidFill>
                 <a:latin typeface="Arial" charset="0"/>
               </a:rPr>
-              <a:t>/</a:t>
-            </a:r>
-            <a:r>
-              <a:rPr lang="en-US" sz="2400" dirty="0">
-                <a:solidFill>
-                  <a:srgbClr val="0000FF"/>
-                </a:solidFill>
-                <a:latin typeface="Arial" charset="0"/>
-              </a:rPr>
-              <a:t>f</a:t>
-            </a:r>
-            <a:r>
-              <a:rPr lang="en-US" sz="2400" dirty="0" smtClean="0">
-                <a:solidFill>
-                  <a:srgbClr val="0000FF"/>
-                </a:solidFill>
-                <a:latin typeface="Arial" charset="0"/>
-              </a:rPr>
-              <a:t>16</a:t>
-            </a:r>
-            <a:r>
-              <a:rPr lang="en-US" sz="2400" dirty="0" smtClean="0">
-                <a:solidFill>
-                  <a:srgbClr val="0000FF"/>
-                </a:solidFill>
-                <a:latin typeface="Arial" charset="0"/>
-              </a:rPr>
-              <a:t>/</a:t>
+              <a:t>16/</a:t>
             </a:r>
             <a:r>
               <a:rPr lang="en-US" sz="2400" dirty="0" err="1">
@@ -14563,7 +14589,16 @@
                 </a:solidFill>
                 <a:latin typeface="Arial" charset="0"/>
               </a:rPr>
-              <a:t>/eece2160</a:t>
+              <a:t>/eece2160/</a:t>
+            </a:r>
+            <a:r>
+              <a:rPr lang="en-US" sz="2400" dirty="0">
+                <a:solidFill>
+                  <a:srgbClr val="0000FF"/>
+                </a:solidFill>
+                <a:latin typeface="Arial" charset="0"/>
+              </a:rPr>
+              <a:t>f</a:t>
             </a:r>
             <a:r>
               <a:rPr lang="en-US" sz="2400" dirty="0" smtClean="0">
@@ -14572,34 +14607,7 @@
                 </a:solidFill>
                 <a:latin typeface="Arial" charset="0"/>
               </a:rPr>
-              <a:t>/</a:t>
-            </a:r>
-            <a:r>
-              <a:rPr lang="en-US" sz="2400" dirty="0">
-                <a:solidFill>
-                  <a:srgbClr val="0000FF"/>
-                </a:solidFill>
-                <a:latin typeface="Arial" charset="0"/>
-              </a:rPr>
-              <a:t>f</a:t>
-            </a:r>
-            <a:r>
-              <a:rPr lang="en-US" sz="2400" dirty="0" smtClean="0">
-                <a:solidFill>
-                  <a:srgbClr val="0000FF"/>
-                </a:solidFill>
-                <a:latin typeface="Arial" charset="0"/>
-              </a:rPr>
-              <a:t>16</a:t>
-            </a:r>
-            <a:r>
-              <a:rPr lang="en-US" sz="2400" dirty="0" smtClean="0">
-                <a:solidFill>
-                  <a:srgbClr val="0000FF"/>
-                </a:solidFill>
-                <a:latin typeface="Arial" charset="0"/>
-              </a:rPr>
-              <a:t>/</a:t>
+              <a:t>16/</a:t>
             </a:r>
             <a:r>
               <a:rPr lang="en-US" sz="2400" dirty="0" err="1" smtClean="0">
@@ -14855,7 +14863,7 @@
               <a:rPr lang="en-US" smtClean="0">
                 <a:latin typeface="Garamond" charset="0"/>
               </a:rPr>
-              <a:t>9/1/16</a:t>
+              <a:t>9/2/16</a:t>
             </a:fld>
             <a:endParaRPr lang="en-US">
               <a:latin typeface="Garamond" charset="0"/>
@@ -15293,7 +15301,7 @@
           <a:p>
             <a:fld id="{C983AF4E-1458-4A4B-8422-E76249AAE24E}" type="datetime1">
               <a:rPr lang="en-US" smtClean="0"/>
-              <a:t>9/1/16</a:t>
+              <a:t>9/2/16</a:t>
             </a:fld>
             <a:endParaRPr lang="en-US"/>
           </a:p>
@@ -15831,7 +15839,7 @@
               <a:rPr lang="en-US" smtClean="0">
                 <a:latin typeface="Garamond" charset="0"/>
               </a:rPr>
-              <a:t>9/1/16</a:t>
+              <a:t>9/2/16</a:t>
             </a:fld>
             <a:endParaRPr lang="en-US">
               <a:latin typeface="Garamond" charset="0"/>
@@ -16361,7 +16369,7 @@
               <a:rPr lang="en-US" smtClean="0">
                 <a:latin typeface="Garamond" charset="0"/>
               </a:rPr>
-              <a:t>9/1/16</a:t>
+              <a:t>9/2/16</a:t>
             </a:fld>
             <a:endParaRPr lang="en-US">
               <a:latin typeface="Garamond" charset="0"/>

</xml_diff>